<commit_message>
Fix bugs in adding media and movie poster to .pptx file.
</commit_message>
<xml_diff>
--- a/src/templates/MasterTemplate.pptx
+++ b/src/templates/MasterTemplate.pptx
@@ -7115,434 +7115,6 @@
 
 <file path=ppt/slideLayouts/slideLayout4.xml><?xml version="1.0" encoding="utf-8"?>
 <p:sldLayout xmlns:a="http://schemas.openxmlformats.org/drawingml/2006/main" xmlns:r="http://schemas.openxmlformats.org/officeDocument/2006/relationships" xmlns:p="http://schemas.openxmlformats.org/presentationml/2006/main" preserve="1" userDrawn="1">
-  <p:cSld name="Title and Media 1">
-    <p:bg>
-      <p:bgPr>
-        <a:solidFill>
-          <a:schemeClr val="bg1">
-            <a:lumMod val="95000"/>
-          </a:schemeClr>
-        </a:solidFill>
-        <a:effectLst/>
-      </p:bgPr>
-    </p:bg>
-    <p:spTree>
-      <p:nvGrpSpPr>
-        <p:cNvPr id="1" name=""/>
-        <p:cNvGrpSpPr/>
-        <p:nvPr/>
-      </p:nvGrpSpPr>
-      <p:grpSpPr>
-        <a:xfrm>
-          <a:off x="0" y="0"/>
-          <a:ext cx="0" cy="0"/>
-          <a:chOff x="0" y="0"/>
-          <a:chExt cx="0" cy="0"/>
-        </a:xfrm>
-      </p:grpSpPr>
-      <p:sp>
-        <p:nvSpPr>
-          <p:cNvPr id="20" name="Rectangle 19">
-            <a:extLst>
-              <a:ext uri="{FF2B5EF4-FFF2-40B4-BE49-F238E27FC236}">
-                <a16:creationId xmlns:a16="http://schemas.microsoft.com/office/drawing/2014/main" id="{9AFFC437-DF02-7776-8224-91AD11D74BD6}"/>
-              </a:ext>
-              <a:ext uri="{C183D7F6-B498-43B3-948B-1728B52AA6E4}">
-                <adec:decorative xmlns:adec="http://schemas.microsoft.com/office/drawing/2017/decorative" val="1"/>
-              </a:ext>
-            </a:extLst>
-          </p:cNvPr>
-          <p:cNvSpPr/>
-          <p:nvPr userDrawn="1"/>
-        </p:nvSpPr>
-        <p:spPr>
-          <a:xfrm>
-            <a:off x="11405238" y="-4"/>
-            <a:ext cx="786761" cy="6858000"/>
-          </a:xfrm>
-          <a:prstGeom prst="rect">
-            <a:avLst/>
-          </a:prstGeom>
-          <a:solidFill>
-            <a:schemeClr val="accent4">
-              <a:lumMod val="40000"/>
-              <a:lumOff val="60000"/>
-            </a:schemeClr>
-          </a:solidFill>
-          <a:ln>
-            <a:noFill/>
-          </a:ln>
-        </p:spPr>
-        <p:style>
-          <a:lnRef idx="2">
-            <a:schemeClr val="accent1">
-              <a:shade val="15000"/>
-            </a:schemeClr>
-          </a:lnRef>
-          <a:fillRef idx="1">
-            <a:schemeClr val="accent1"/>
-          </a:fillRef>
-          <a:effectRef idx="0">
-            <a:schemeClr val="accent1"/>
-          </a:effectRef>
-          <a:fontRef idx="minor">
-            <a:schemeClr val="lt1"/>
-          </a:fontRef>
-        </p:style>
-        <p:txBody>
-          <a:bodyPr rtlCol="0" anchor="ctr"/>
-          <a:lstStyle/>
-          <a:p>
-            <a:pPr algn="ctr"/>
-            <a:endParaRPr lang="en-US" dirty="0"/>
-          </a:p>
-        </p:txBody>
-      </p:sp>
-      <p:sp>
-        <p:nvSpPr>
-          <p:cNvPr id="19" name="Rectangle 18">
-            <a:extLst>
-              <a:ext uri="{FF2B5EF4-FFF2-40B4-BE49-F238E27FC236}">
-                <a16:creationId xmlns:a16="http://schemas.microsoft.com/office/drawing/2014/main" id="{8B767E2A-FC6B-2D96-EF20-768A6E8BB6D9}"/>
-              </a:ext>
-              <a:ext uri="{C183D7F6-B498-43B3-948B-1728B52AA6E4}">
-                <adec:decorative xmlns:adec="http://schemas.microsoft.com/office/drawing/2017/decorative" val="1"/>
-              </a:ext>
-            </a:extLst>
-          </p:cNvPr>
-          <p:cNvSpPr/>
-          <p:nvPr userDrawn="1"/>
-        </p:nvSpPr>
-        <p:spPr>
-          <a:xfrm>
-            <a:off x="0" y="0"/>
-            <a:ext cx="3063238" cy="6858000"/>
-          </a:xfrm>
-          <a:prstGeom prst="rect">
-            <a:avLst/>
-          </a:prstGeom>
-          <a:solidFill>
-            <a:schemeClr val="accent4">
-              <a:lumMod val="40000"/>
-              <a:lumOff val="60000"/>
-            </a:schemeClr>
-          </a:solidFill>
-          <a:ln>
-            <a:noFill/>
-          </a:ln>
-        </p:spPr>
-        <p:style>
-          <a:lnRef idx="2">
-            <a:schemeClr val="accent1">
-              <a:shade val="15000"/>
-            </a:schemeClr>
-          </a:lnRef>
-          <a:fillRef idx="1">
-            <a:schemeClr val="accent1"/>
-          </a:fillRef>
-          <a:effectRef idx="0">
-            <a:schemeClr val="accent1"/>
-          </a:effectRef>
-          <a:fontRef idx="minor">
-            <a:schemeClr val="lt1"/>
-          </a:fontRef>
-        </p:style>
-        <p:txBody>
-          <a:bodyPr rtlCol="0" anchor="ctr"/>
-          <a:lstStyle/>
-          <a:p>
-            <a:pPr algn="ctr"/>
-            <a:endParaRPr lang="en-US" dirty="0"/>
-          </a:p>
-        </p:txBody>
-      </p:sp>
-      <p:sp>
-        <p:nvSpPr>
-          <p:cNvPr id="12" name="Title 1">
-            <a:extLst>
-              <a:ext uri="{FF2B5EF4-FFF2-40B4-BE49-F238E27FC236}">
-                <a16:creationId xmlns:a16="http://schemas.microsoft.com/office/drawing/2014/main" id="{71A79F2D-2D69-D1C7-FD7D-70C2EAE42085}"/>
-              </a:ext>
-            </a:extLst>
-          </p:cNvPr>
-          <p:cNvSpPr>
-            <a:spLocks noGrp="1"/>
-          </p:cNvSpPr>
-          <p:nvPr>
-            <p:ph type="title" hasCustomPrompt="1"/>
-          </p:nvPr>
-        </p:nvSpPr>
-        <p:spPr>
-          <a:xfrm rot="16200000">
-            <a:off x="-1749423" y="2290758"/>
-            <a:ext cx="6276974" cy="2276477"/>
-          </a:xfrm>
-          <a:effectLst/>
-        </p:spPr>
-        <p:txBody>
-          <a:bodyPr tIns="0" bIns="0" anchor="ctr">
-            <a:noAutofit/>
-          </a:bodyPr>
-          <a:lstStyle>
-            <a:lvl1pPr algn="ctr">
-              <a:defRPr sz="4000" b="0" cap="all" spc="0" baseline="0">
-                <a:solidFill>
-                  <a:schemeClr val="tx2"/>
-                </a:solidFill>
-              </a:defRPr>
-            </a:lvl1pPr>
-          </a:lstStyle>
-          <a:p>
-            <a:r>
-              <a:rPr lang="en-US" dirty="0"/>
-              <a:t>Click to Add title</a:t>
-            </a:r>
-          </a:p>
-        </p:txBody>
-      </p:sp>
-      <p:sp>
-        <p:nvSpPr>
-          <p:cNvPr id="14" name="Slide Number Placeholder 4">
-            <a:extLst>
-              <a:ext uri="{FF2B5EF4-FFF2-40B4-BE49-F238E27FC236}">
-                <a16:creationId xmlns:a16="http://schemas.microsoft.com/office/drawing/2014/main" id="{405BE07A-FC17-07E2-4E28-5883FC2CAE76}"/>
-              </a:ext>
-            </a:extLst>
-          </p:cNvPr>
-          <p:cNvSpPr>
-            <a:spLocks noGrp="1"/>
-          </p:cNvSpPr>
-          <p:nvPr>
-            <p:ph type="sldNum" sz="quarter" idx="12"/>
-          </p:nvPr>
-        </p:nvSpPr>
-        <p:spPr>
-          <a:xfrm>
-            <a:off x="2194590" y="3062287"/>
-            <a:ext cx="665421" cy="766763"/>
-          </a:xfrm>
-          <a:prstGeom prst="rect">
-            <a:avLst/>
-          </a:prstGeom>
-          <a:noFill/>
-          <a:effectLst/>
-        </p:spPr>
-        <p:txBody>
-          <a:bodyPr lIns="0" rIns="0"/>
-          <a:lstStyle>
-            <a:lvl1pPr algn="ctr">
-              <a:defRPr lang="en-US" sz="1800" b="1" kern="1200" cap="all" spc="150" baseline="0" smtClean="0">
-                <a:solidFill>
-                  <a:schemeClr val="tx2"/>
-                </a:solidFill>
-                <a:latin typeface="+mn-lt"/>
-                <a:ea typeface="+mn-ea"/>
-                <a:cs typeface="+mn-cs"/>
-              </a:defRPr>
-            </a:lvl1pPr>
-          </a:lstStyle>
-          <a:p>
-            <a:fld id="{8A7A6979-0714-4377-B894-6BE4C2D6E202}" type="slidenum">
-              <a:rPr lang="en-US" smtClean="0"/>
-              <a:pPr/>
-              <a:t>‹#›</a:t>
-            </a:fld>
-            <a:endParaRPr lang="en-US" dirty="0"/>
-          </a:p>
-        </p:txBody>
-      </p:sp>
-      <p:sp>
-        <p:nvSpPr>
-          <p:cNvPr id="15" name="Rectangle 14">
-            <a:extLst>
-              <a:ext uri="{FF2B5EF4-FFF2-40B4-BE49-F238E27FC236}">
-                <a16:creationId xmlns:a16="http://schemas.microsoft.com/office/drawing/2014/main" id="{1B6D408C-2A4E-CEE1-5980-F9BC89383CA8}"/>
-              </a:ext>
-              <a:ext uri="{C183D7F6-B498-43B3-948B-1728B52AA6E4}">
-                <adec:decorative xmlns:adec="http://schemas.microsoft.com/office/drawing/2017/decorative" val="1"/>
-              </a:ext>
-            </a:extLst>
-          </p:cNvPr>
-          <p:cNvSpPr/>
-          <p:nvPr userDrawn="1"/>
-        </p:nvSpPr>
-        <p:spPr>
-          <a:xfrm>
-            <a:off x="250825" y="254794"/>
-            <a:ext cx="11690350" cy="6348413"/>
-          </a:xfrm>
-          <a:prstGeom prst="rect">
-            <a:avLst/>
-          </a:prstGeom>
-          <a:noFill/>
-          <a:ln w="44450">
-            <a:solidFill>
-              <a:schemeClr val="tx2"/>
-            </a:solidFill>
-          </a:ln>
-        </p:spPr>
-        <p:style>
-          <a:lnRef idx="2">
-            <a:schemeClr val="accent1">
-              <a:shade val="15000"/>
-            </a:schemeClr>
-          </a:lnRef>
-          <a:fillRef idx="1">
-            <a:schemeClr val="accent1"/>
-          </a:fillRef>
-          <a:effectRef idx="0">
-            <a:schemeClr val="accent1"/>
-          </a:effectRef>
-          <a:fontRef idx="minor">
-            <a:schemeClr val="lt1"/>
-          </a:fontRef>
-        </p:style>
-        <p:txBody>
-          <a:bodyPr rtlCol="0" anchor="ctr"/>
-          <a:lstStyle/>
-          <a:p>
-            <a:pPr algn="ctr"/>
-            <a:endParaRPr lang="en-US" dirty="0"/>
-          </a:p>
-        </p:txBody>
-      </p:sp>
-      <p:cxnSp>
-        <p:nvCxnSpPr>
-          <p:cNvPr id="16" name="Straight Connector 15">
-            <a:extLst>
-              <a:ext uri="{FF2B5EF4-FFF2-40B4-BE49-F238E27FC236}">
-                <a16:creationId xmlns:a16="http://schemas.microsoft.com/office/drawing/2014/main" id="{44E622ED-3DA5-D5E9-B688-B2000E522060}"/>
-              </a:ext>
-              <a:ext uri="{C183D7F6-B498-43B3-948B-1728B52AA6E4}">
-                <adec:decorative xmlns:adec="http://schemas.microsoft.com/office/drawing/2017/decorative" val="1"/>
-              </a:ext>
-            </a:extLst>
-          </p:cNvPr>
-          <p:cNvCxnSpPr>
-            <a:cxnSpLocks/>
-          </p:cNvCxnSpPr>
-          <p:nvPr userDrawn="1"/>
-        </p:nvCxnSpPr>
-        <p:spPr>
-          <a:xfrm>
-            <a:off x="2527301" y="254794"/>
-            <a:ext cx="0" cy="2799556"/>
-          </a:xfrm>
-          <a:prstGeom prst="line">
-            <a:avLst/>
-          </a:prstGeom>
-          <a:ln w="44450">
-            <a:solidFill>
-              <a:schemeClr val="tx2"/>
-            </a:solidFill>
-          </a:ln>
-        </p:spPr>
-        <p:style>
-          <a:lnRef idx="1">
-            <a:schemeClr val="accent1"/>
-          </a:lnRef>
-          <a:fillRef idx="0">
-            <a:schemeClr val="accent1"/>
-          </a:fillRef>
-          <a:effectRef idx="0">
-            <a:schemeClr val="accent1"/>
-          </a:effectRef>
-          <a:fontRef idx="minor">
-            <a:schemeClr val="tx1"/>
-          </a:fontRef>
-        </p:style>
-      </p:cxnSp>
-      <p:cxnSp>
-        <p:nvCxnSpPr>
-          <p:cNvPr id="17" name="Straight Connector 16">
-            <a:extLst>
-              <a:ext uri="{FF2B5EF4-FFF2-40B4-BE49-F238E27FC236}">
-                <a16:creationId xmlns:a16="http://schemas.microsoft.com/office/drawing/2014/main" id="{8F1677B7-A20C-1A5D-301E-5B7DCAF1B61A}"/>
-              </a:ext>
-              <a:ext uri="{C183D7F6-B498-43B3-948B-1728B52AA6E4}">
-                <adec:decorative xmlns:adec="http://schemas.microsoft.com/office/drawing/2017/decorative" val="1"/>
-              </a:ext>
-            </a:extLst>
-          </p:cNvPr>
-          <p:cNvCxnSpPr>
-            <a:cxnSpLocks/>
-          </p:cNvCxnSpPr>
-          <p:nvPr userDrawn="1"/>
-        </p:nvCxnSpPr>
-        <p:spPr>
-          <a:xfrm>
-            <a:off x="2527301" y="3822700"/>
-            <a:ext cx="0" cy="2799556"/>
-          </a:xfrm>
-          <a:prstGeom prst="line">
-            <a:avLst/>
-          </a:prstGeom>
-          <a:ln w="44450">
-            <a:solidFill>
-              <a:schemeClr val="tx2"/>
-            </a:solidFill>
-          </a:ln>
-        </p:spPr>
-        <p:style>
-          <a:lnRef idx="1">
-            <a:schemeClr val="accent1"/>
-          </a:lnRef>
-          <a:fillRef idx="0">
-            <a:schemeClr val="accent1"/>
-          </a:fillRef>
-          <a:effectRef idx="0">
-            <a:schemeClr val="accent1"/>
-          </a:effectRef>
-          <a:fontRef idx="minor">
-            <a:schemeClr val="tx1"/>
-          </a:fontRef>
-        </p:style>
-      </p:cxnSp>
-      <p:sp>
-        <p:nvSpPr>
-          <p:cNvPr id="4" name="媒体占位符 3">
-            <a:extLst>
-              <a:ext uri="{FF2B5EF4-FFF2-40B4-BE49-F238E27FC236}">
-                <a16:creationId xmlns:a16="http://schemas.microsoft.com/office/drawing/2014/main" id="{F05CAE1B-DEF9-4C38-A50B-CDFE05ABCE3B}"/>
-              </a:ext>
-            </a:extLst>
-          </p:cNvPr>
-          <p:cNvSpPr>
-            <a:spLocks noGrp="1"/>
-          </p:cNvSpPr>
-          <p:nvPr>
-            <p:ph type="media" sz="quarter" idx="15"/>
-          </p:nvPr>
-        </p:nvSpPr>
-        <p:spPr>
-          <a:xfrm>
-            <a:off x="3489960" y="892174"/>
-            <a:ext cx="7482839" cy="5073650"/>
-          </a:xfrm>
-        </p:spPr>
-        <p:txBody>
-          <a:bodyPr/>
-          <a:lstStyle/>
-          <a:p>
-            <a:endParaRPr lang="zh-CN" altLang="en-US"/>
-          </a:p>
-        </p:txBody>
-      </p:sp>
-    </p:spTree>
-    <p:extLst>
-      <p:ext uri="{BB962C8B-B14F-4D97-AF65-F5344CB8AC3E}">
-        <p14:creationId xmlns:p14="http://schemas.microsoft.com/office/powerpoint/2010/main" val="1036363016"/>
-      </p:ext>
-    </p:extLst>
-  </p:cSld>
-  <p:clrMapOvr>
-    <a:masterClrMapping/>
-  </p:clrMapOvr>
-</p:sldLayout>
-</file>
-
-<file path=ppt/slideLayouts/slideLayout5.xml><?xml version="1.0" encoding="utf-8"?>
-<p:sldLayout xmlns:a="http://schemas.openxmlformats.org/drawingml/2006/main" xmlns:r="http://schemas.openxmlformats.org/officeDocument/2006/relationships" xmlns:p="http://schemas.openxmlformats.org/presentationml/2006/main" preserve="1" userDrawn="1">
   <p:cSld name="Title and 2 Column">
     <p:bg>
       <p:bgPr>
@@ -7996,9 +7568,9 @@
 </p:sldLayout>
 </file>
 
-<file path=ppt/slideLayouts/slideLayout6.xml><?xml version="1.0" encoding="utf-8"?>
+<file path=ppt/slideLayouts/slideLayout5.xml><?xml version="1.0" encoding="utf-8"?>
 <p:sldLayout xmlns:a="http://schemas.openxmlformats.org/drawingml/2006/main" xmlns:r="http://schemas.openxmlformats.org/officeDocument/2006/relationships" xmlns:p="http://schemas.openxmlformats.org/presentationml/2006/main" preserve="1" userDrawn="1">
-  <p:cSld name="Title Content and Media">
+  <p:cSld name="Title Content and Table">
     <p:bg>
       <p:bgPr>
         <a:solidFill>
@@ -8410,10 +7982,10 @@
       </p:sp>
       <p:sp>
         <p:nvSpPr>
-          <p:cNvPr id="5" name="媒体占位符 4">
-            <a:extLst>
-              <a:ext uri="{FF2B5EF4-FFF2-40B4-BE49-F238E27FC236}">
-                <a16:creationId xmlns:a16="http://schemas.microsoft.com/office/drawing/2014/main" id="{DD761FED-39EF-4ABA-979E-8B19B83483A1}"/>
+          <p:cNvPr id="6" name="Table Placeholder 5">
+            <a:extLst>
+              <a:ext uri="{FF2B5EF4-FFF2-40B4-BE49-F238E27FC236}">
+                <a16:creationId xmlns:a16="http://schemas.microsoft.com/office/drawing/2014/main" id="{BE81C174-B581-A6F3-A3B5-8072C0050E9C}"/>
               </a:ext>
             </a:extLst>
           </p:cNvPr>
@@ -8421,27 +7993,54 @@
             <a:spLocks noGrp="1"/>
           </p:cNvSpPr>
           <p:nvPr>
-            <p:ph type="media" sz="quarter" idx="15"/>
+            <p:ph type="tbl" sz="quarter" idx="13"/>
           </p:nvPr>
         </p:nvSpPr>
         <p:spPr>
           <a:xfrm>
-            <a:off x="4851399" y="2495072"/>
+            <a:off x="4851400" y="2495074"/>
             <a:ext cx="6643944" cy="3776186"/>
           </a:xfrm>
         </p:spPr>
         <p:txBody>
           <a:bodyPr/>
-          <a:lstStyle/>
-          <a:p>
-            <a:endParaRPr lang="zh-CN" altLang="en-US"/>
+          <a:lstStyle>
+            <a:lvl1pPr>
+              <a:defRPr/>
+            </a:lvl1pPr>
+          </a:lstStyle>
+          <a:p>
+            <a:pPr marL="228600" marR="0" lvl="0" indent="-228600" algn="l" defTabSz="914400" rtl="0" eaLnBrk="1" fontAlgn="auto" latinLnBrk="0" hangingPunct="1">
+              <a:lnSpc>
+                <a:spcPct val="100000"/>
+              </a:lnSpc>
+              <a:spcBef>
+                <a:spcPts val="1000"/>
+              </a:spcBef>
+              <a:spcAft>
+                <a:spcPts val="0"/>
+              </a:spcAft>
+              <a:buClr>
+                <a:schemeClr val="accent2"/>
+              </a:buClr>
+              <a:buSzTx/>
+              <a:buFont typeface="Arial" panose="020B0604020202020204" pitchFamily="34" charset="0"/>
+              <a:buChar char="•"/>
+              <a:tabLst/>
+              <a:defRPr/>
+            </a:pPr>
+            <a:r>
+              <a:rPr lang="en-US"/>
+              <a:t>Click icon to add table</a:t>
+            </a:r>
+            <a:endParaRPr lang="en-US" dirty="0"/>
           </a:p>
         </p:txBody>
       </p:sp>
     </p:spTree>
     <p:extLst>
       <p:ext uri="{BB962C8B-B14F-4D97-AF65-F5344CB8AC3E}">
-        <p14:creationId xmlns:p14="http://schemas.microsoft.com/office/powerpoint/2010/main" val="1165427188"/>
+        <p14:creationId xmlns:p14="http://schemas.microsoft.com/office/powerpoint/2010/main" val="2927646899"/>
       </p:ext>
     </p:extLst>
   </p:cSld>
@@ -8451,9 +8050,9 @@
 </p:sldLayout>
 </file>
 
-<file path=ppt/slideLayouts/slideLayout7.xml><?xml version="1.0" encoding="utf-8"?>
+<file path=ppt/slideLayouts/slideLayout6.xml><?xml version="1.0" encoding="utf-8"?>
 <p:sldLayout xmlns:a="http://schemas.openxmlformats.org/drawingml/2006/main" xmlns:r="http://schemas.openxmlformats.org/officeDocument/2006/relationships" xmlns:p="http://schemas.openxmlformats.org/presentationml/2006/main" preserve="1" userDrawn="1">
-  <p:cSld name="Title Content and Table">
+  <p:cSld name="Title Content and Chart">
     <p:bg>
       <p:bgPr>
         <a:solidFill>
@@ -8865,10 +8464,10 @@
       </p:sp>
       <p:sp>
         <p:nvSpPr>
-          <p:cNvPr id="6" name="Table Placeholder 5">
-            <a:extLst>
-              <a:ext uri="{FF2B5EF4-FFF2-40B4-BE49-F238E27FC236}">
-                <a16:creationId xmlns:a16="http://schemas.microsoft.com/office/drawing/2014/main" id="{BE81C174-B581-A6F3-A3B5-8072C0050E9C}"/>
+          <p:cNvPr id="3" name="图表占位符 2">
+            <a:extLst>
+              <a:ext uri="{FF2B5EF4-FFF2-40B4-BE49-F238E27FC236}">
+                <a16:creationId xmlns:a16="http://schemas.microsoft.com/office/drawing/2014/main" id="{9EDC2E16-2FC6-47C1-9060-76684E8F65CA}"/>
               </a:ext>
             </a:extLst>
           </p:cNvPr>
@@ -8876,7 +8475,7 @@
             <a:spLocks noGrp="1"/>
           </p:cNvSpPr>
           <p:nvPr>
-            <p:ph type="tbl" sz="quarter" idx="13"/>
+            <p:ph type="chart" sz="quarter" idx="14"/>
           </p:nvPr>
         </p:nvSpPr>
         <p:spPr>
@@ -8887,43 +8486,444 @@
         </p:spPr>
         <p:txBody>
           <a:bodyPr/>
-          <a:lstStyle>
-            <a:lvl1pPr>
-              <a:defRPr/>
-            </a:lvl1pPr>
-          </a:lstStyle>
-          <a:p>
-            <a:pPr marL="228600" marR="0" lvl="0" indent="-228600" algn="l" defTabSz="914400" rtl="0" eaLnBrk="1" fontAlgn="auto" latinLnBrk="0" hangingPunct="1">
-              <a:lnSpc>
-                <a:spcPct val="100000"/>
-              </a:lnSpc>
-              <a:spcBef>
-                <a:spcPts val="1000"/>
-              </a:spcBef>
-              <a:spcAft>
-                <a:spcPts val="0"/>
-              </a:spcAft>
-              <a:buClr>
-                <a:schemeClr val="accent2"/>
-              </a:buClr>
-              <a:buSzTx/>
-              <a:buFont typeface="Arial" panose="020B0604020202020204" pitchFamily="34" charset="0"/>
-              <a:buChar char="•"/>
-              <a:tabLst/>
-              <a:defRPr/>
-            </a:pPr>
-            <a:r>
-              <a:rPr lang="en-US"/>
-              <a:t>Click icon to add table</a:t>
-            </a:r>
-            <a:endParaRPr lang="en-US" dirty="0"/>
+          <a:lstStyle/>
+          <a:p>
+            <a:endParaRPr lang="zh-CN" altLang="en-US" dirty="0"/>
           </a:p>
         </p:txBody>
       </p:sp>
     </p:spTree>
     <p:extLst>
       <p:ext uri="{BB962C8B-B14F-4D97-AF65-F5344CB8AC3E}">
-        <p14:creationId xmlns:p14="http://schemas.microsoft.com/office/powerpoint/2010/main" val="2927646899"/>
+        <p14:creationId xmlns:p14="http://schemas.microsoft.com/office/powerpoint/2010/main" val="3877406510"/>
+      </p:ext>
+    </p:extLst>
+  </p:cSld>
+  <p:clrMapOvr>
+    <a:masterClrMapping/>
+  </p:clrMapOvr>
+</p:sldLayout>
+</file>
+
+<file path=ppt/slideLayouts/slideLayout7.xml><?xml version="1.0" encoding="utf-8"?>
+<p:sldLayout xmlns:a="http://schemas.openxmlformats.org/drawingml/2006/main" xmlns:r="http://schemas.openxmlformats.org/officeDocument/2006/relationships" xmlns:p="http://schemas.openxmlformats.org/presentationml/2006/main" preserve="1" userDrawn="1">
+  <p:cSld name="Title and Media 1">
+    <p:bg>
+      <p:bgPr>
+        <a:solidFill>
+          <a:schemeClr val="bg1">
+            <a:lumMod val="95000"/>
+          </a:schemeClr>
+        </a:solidFill>
+        <a:effectLst/>
+      </p:bgPr>
+    </p:bg>
+    <p:spTree>
+      <p:nvGrpSpPr>
+        <p:cNvPr id="1" name=""/>
+        <p:cNvGrpSpPr/>
+        <p:nvPr/>
+      </p:nvGrpSpPr>
+      <p:grpSpPr>
+        <a:xfrm>
+          <a:off x="0" y="0"/>
+          <a:ext cx="0" cy="0"/>
+          <a:chOff x="0" y="0"/>
+          <a:chExt cx="0" cy="0"/>
+        </a:xfrm>
+      </p:grpSpPr>
+      <p:sp>
+        <p:nvSpPr>
+          <p:cNvPr id="20" name="Rectangle 19">
+            <a:extLst>
+              <a:ext uri="{FF2B5EF4-FFF2-40B4-BE49-F238E27FC236}">
+                <a16:creationId xmlns:a16="http://schemas.microsoft.com/office/drawing/2014/main" id="{9AFFC437-DF02-7776-8224-91AD11D74BD6}"/>
+              </a:ext>
+              <a:ext uri="{C183D7F6-B498-43B3-948B-1728B52AA6E4}">
+                <adec:decorative xmlns:adec="http://schemas.microsoft.com/office/drawing/2017/decorative" val="1"/>
+              </a:ext>
+            </a:extLst>
+          </p:cNvPr>
+          <p:cNvSpPr/>
+          <p:nvPr userDrawn="1"/>
+        </p:nvSpPr>
+        <p:spPr>
+          <a:xfrm>
+            <a:off x="11405238" y="-4"/>
+            <a:ext cx="786761" cy="6858000"/>
+          </a:xfrm>
+          <a:prstGeom prst="rect">
+            <a:avLst/>
+          </a:prstGeom>
+          <a:solidFill>
+            <a:schemeClr val="accent4">
+              <a:lumMod val="40000"/>
+              <a:lumOff val="60000"/>
+            </a:schemeClr>
+          </a:solidFill>
+          <a:ln>
+            <a:noFill/>
+          </a:ln>
+        </p:spPr>
+        <p:style>
+          <a:lnRef idx="2">
+            <a:schemeClr val="accent1">
+              <a:shade val="15000"/>
+            </a:schemeClr>
+          </a:lnRef>
+          <a:fillRef idx="1">
+            <a:schemeClr val="accent1"/>
+          </a:fillRef>
+          <a:effectRef idx="0">
+            <a:schemeClr val="accent1"/>
+          </a:effectRef>
+          <a:fontRef idx="minor">
+            <a:schemeClr val="lt1"/>
+          </a:fontRef>
+        </p:style>
+        <p:txBody>
+          <a:bodyPr rtlCol="0" anchor="ctr"/>
+          <a:lstStyle/>
+          <a:p>
+            <a:pPr algn="ctr"/>
+            <a:endParaRPr lang="en-US" dirty="0"/>
+          </a:p>
+        </p:txBody>
+      </p:sp>
+      <p:sp>
+        <p:nvSpPr>
+          <p:cNvPr id="19" name="Rectangle 18">
+            <a:extLst>
+              <a:ext uri="{FF2B5EF4-FFF2-40B4-BE49-F238E27FC236}">
+                <a16:creationId xmlns:a16="http://schemas.microsoft.com/office/drawing/2014/main" id="{8B767E2A-FC6B-2D96-EF20-768A6E8BB6D9}"/>
+              </a:ext>
+              <a:ext uri="{C183D7F6-B498-43B3-948B-1728B52AA6E4}">
+                <adec:decorative xmlns:adec="http://schemas.microsoft.com/office/drawing/2017/decorative" val="1"/>
+              </a:ext>
+            </a:extLst>
+          </p:cNvPr>
+          <p:cNvSpPr/>
+          <p:nvPr userDrawn="1"/>
+        </p:nvSpPr>
+        <p:spPr>
+          <a:xfrm>
+            <a:off x="0" y="0"/>
+            <a:ext cx="3063238" cy="6858000"/>
+          </a:xfrm>
+          <a:prstGeom prst="rect">
+            <a:avLst/>
+          </a:prstGeom>
+          <a:solidFill>
+            <a:schemeClr val="accent4">
+              <a:lumMod val="40000"/>
+              <a:lumOff val="60000"/>
+            </a:schemeClr>
+          </a:solidFill>
+          <a:ln>
+            <a:noFill/>
+          </a:ln>
+        </p:spPr>
+        <p:style>
+          <a:lnRef idx="2">
+            <a:schemeClr val="accent1">
+              <a:shade val="15000"/>
+            </a:schemeClr>
+          </a:lnRef>
+          <a:fillRef idx="1">
+            <a:schemeClr val="accent1"/>
+          </a:fillRef>
+          <a:effectRef idx="0">
+            <a:schemeClr val="accent1"/>
+          </a:effectRef>
+          <a:fontRef idx="minor">
+            <a:schemeClr val="lt1"/>
+          </a:fontRef>
+        </p:style>
+        <p:txBody>
+          <a:bodyPr rtlCol="0" anchor="ctr"/>
+          <a:lstStyle/>
+          <a:p>
+            <a:pPr algn="ctr"/>
+            <a:endParaRPr lang="en-US" dirty="0"/>
+          </a:p>
+        </p:txBody>
+      </p:sp>
+      <p:sp>
+        <p:nvSpPr>
+          <p:cNvPr id="12" name="Title 1">
+            <a:extLst>
+              <a:ext uri="{FF2B5EF4-FFF2-40B4-BE49-F238E27FC236}">
+                <a16:creationId xmlns:a16="http://schemas.microsoft.com/office/drawing/2014/main" id="{71A79F2D-2D69-D1C7-FD7D-70C2EAE42085}"/>
+              </a:ext>
+            </a:extLst>
+          </p:cNvPr>
+          <p:cNvSpPr>
+            <a:spLocks noGrp="1"/>
+          </p:cNvSpPr>
+          <p:nvPr>
+            <p:ph type="title" hasCustomPrompt="1"/>
+          </p:nvPr>
+        </p:nvSpPr>
+        <p:spPr>
+          <a:xfrm rot="16200000">
+            <a:off x="-1749423" y="2290758"/>
+            <a:ext cx="6276974" cy="2276477"/>
+          </a:xfrm>
+          <a:effectLst/>
+        </p:spPr>
+        <p:txBody>
+          <a:bodyPr tIns="0" bIns="0" anchor="ctr">
+            <a:noAutofit/>
+          </a:bodyPr>
+          <a:lstStyle>
+            <a:lvl1pPr algn="ctr">
+              <a:defRPr sz="4000" b="0" cap="all" spc="0" baseline="0">
+                <a:solidFill>
+                  <a:schemeClr val="tx2"/>
+                </a:solidFill>
+              </a:defRPr>
+            </a:lvl1pPr>
+          </a:lstStyle>
+          <a:p>
+            <a:r>
+              <a:rPr lang="en-US" dirty="0"/>
+              <a:t>Click to Add title</a:t>
+            </a:r>
+          </a:p>
+        </p:txBody>
+      </p:sp>
+      <p:sp>
+        <p:nvSpPr>
+          <p:cNvPr id="14" name="Slide Number Placeholder 4">
+            <a:extLst>
+              <a:ext uri="{FF2B5EF4-FFF2-40B4-BE49-F238E27FC236}">
+                <a16:creationId xmlns:a16="http://schemas.microsoft.com/office/drawing/2014/main" id="{405BE07A-FC17-07E2-4E28-5883FC2CAE76}"/>
+              </a:ext>
+            </a:extLst>
+          </p:cNvPr>
+          <p:cNvSpPr>
+            <a:spLocks noGrp="1"/>
+          </p:cNvSpPr>
+          <p:nvPr>
+            <p:ph type="sldNum" sz="quarter" idx="12"/>
+          </p:nvPr>
+        </p:nvSpPr>
+        <p:spPr>
+          <a:xfrm>
+            <a:off x="2194590" y="3062287"/>
+            <a:ext cx="665421" cy="766763"/>
+          </a:xfrm>
+          <a:prstGeom prst="rect">
+            <a:avLst/>
+          </a:prstGeom>
+          <a:noFill/>
+          <a:effectLst/>
+        </p:spPr>
+        <p:txBody>
+          <a:bodyPr lIns="0" rIns="0"/>
+          <a:lstStyle>
+            <a:lvl1pPr algn="ctr">
+              <a:defRPr lang="en-US" sz="1800" b="1" kern="1200" cap="all" spc="150" baseline="0" smtClean="0">
+                <a:solidFill>
+                  <a:schemeClr val="tx2"/>
+                </a:solidFill>
+                <a:latin typeface="+mn-lt"/>
+                <a:ea typeface="+mn-ea"/>
+                <a:cs typeface="+mn-cs"/>
+              </a:defRPr>
+            </a:lvl1pPr>
+          </a:lstStyle>
+          <a:p>
+            <a:fld id="{8A7A6979-0714-4377-B894-6BE4C2D6E202}" type="slidenum">
+              <a:rPr lang="en-US" smtClean="0"/>
+              <a:pPr/>
+              <a:t>‹#›</a:t>
+            </a:fld>
+            <a:endParaRPr lang="en-US" dirty="0"/>
+          </a:p>
+        </p:txBody>
+      </p:sp>
+      <p:sp>
+        <p:nvSpPr>
+          <p:cNvPr id="15" name="Rectangle 14">
+            <a:extLst>
+              <a:ext uri="{FF2B5EF4-FFF2-40B4-BE49-F238E27FC236}">
+                <a16:creationId xmlns:a16="http://schemas.microsoft.com/office/drawing/2014/main" id="{1B6D408C-2A4E-CEE1-5980-F9BC89383CA8}"/>
+              </a:ext>
+              <a:ext uri="{C183D7F6-B498-43B3-948B-1728B52AA6E4}">
+                <adec:decorative xmlns:adec="http://schemas.microsoft.com/office/drawing/2017/decorative" val="1"/>
+              </a:ext>
+            </a:extLst>
+          </p:cNvPr>
+          <p:cNvSpPr/>
+          <p:nvPr userDrawn="1"/>
+        </p:nvSpPr>
+        <p:spPr>
+          <a:xfrm>
+            <a:off x="250825" y="254794"/>
+            <a:ext cx="11690350" cy="6348413"/>
+          </a:xfrm>
+          <a:prstGeom prst="rect">
+            <a:avLst/>
+          </a:prstGeom>
+          <a:noFill/>
+          <a:ln w="44450">
+            <a:solidFill>
+              <a:schemeClr val="tx2"/>
+            </a:solidFill>
+          </a:ln>
+        </p:spPr>
+        <p:style>
+          <a:lnRef idx="2">
+            <a:schemeClr val="accent1">
+              <a:shade val="15000"/>
+            </a:schemeClr>
+          </a:lnRef>
+          <a:fillRef idx="1">
+            <a:schemeClr val="accent1"/>
+          </a:fillRef>
+          <a:effectRef idx="0">
+            <a:schemeClr val="accent1"/>
+          </a:effectRef>
+          <a:fontRef idx="minor">
+            <a:schemeClr val="lt1"/>
+          </a:fontRef>
+        </p:style>
+        <p:txBody>
+          <a:bodyPr rtlCol="0" anchor="ctr"/>
+          <a:lstStyle/>
+          <a:p>
+            <a:pPr algn="ctr"/>
+            <a:endParaRPr lang="en-US" dirty="0"/>
+          </a:p>
+        </p:txBody>
+      </p:sp>
+      <p:cxnSp>
+        <p:nvCxnSpPr>
+          <p:cNvPr id="16" name="Straight Connector 15">
+            <a:extLst>
+              <a:ext uri="{FF2B5EF4-FFF2-40B4-BE49-F238E27FC236}">
+                <a16:creationId xmlns:a16="http://schemas.microsoft.com/office/drawing/2014/main" id="{44E622ED-3DA5-D5E9-B688-B2000E522060}"/>
+              </a:ext>
+              <a:ext uri="{C183D7F6-B498-43B3-948B-1728B52AA6E4}">
+                <adec:decorative xmlns:adec="http://schemas.microsoft.com/office/drawing/2017/decorative" val="1"/>
+              </a:ext>
+            </a:extLst>
+          </p:cNvPr>
+          <p:cNvCxnSpPr>
+            <a:cxnSpLocks/>
+          </p:cNvCxnSpPr>
+          <p:nvPr userDrawn="1"/>
+        </p:nvCxnSpPr>
+        <p:spPr>
+          <a:xfrm>
+            <a:off x="2527301" y="254794"/>
+            <a:ext cx="0" cy="2799556"/>
+          </a:xfrm>
+          <a:prstGeom prst="line">
+            <a:avLst/>
+          </a:prstGeom>
+          <a:ln w="44450">
+            <a:solidFill>
+              <a:schemeClr val="tx2"/>
+            </a:solidFill>
+          </a:ln>
+        </p:spPr>
+        <p:style>
+          <a:lnRef idx="1">
+            <a:schemeClr val="accent1"/>
+          </a:lnRef>
+          <a:fillRef idx="0">
+            <a:schemeClr val="accent1"/>
+          </a:fillRef>
+          <a:effectRef idx="0">
+            <a:schemeClr val="accent1"/>
+          </a:effectRef>
+          <a:fontRef idx="minor">
+            <a:schemeClr val="tx1"/>
+          </a:fontRef>
+        </p:style>
+      </p:cxnSp>
+      <p:cxnSp>
+        <p:nvCxnSpPr>
+          <p:cNvPr id="17" name="Straight Connector 16">
+            <a:extLst>
+              <a:ext uri="{FF2B5EF4-FFF2-40B4-BE49-F238E27FC236}">
+                <a16:creationId xmlns:a16="http://schemas.microsoft.com/office/drawing/2014/main" id="{8F1677B7-A20C-1A5D-301E-5B7DCAF1B61A}"/>
+              </a:ext>
+              <a:ext uri="{C183D7F6-B498-43B3-948B-1728B52AA6E4}">
+                <adec:decorative xmlns:adec="http://schemas.microsoft.com/office/drawing/2017/decorative" val="1"/>
+              </a:ext>
+            </a:extLst>
+          </p:cNvPr>
+          <p:cNvCxnSpPr>
+            <a:cxnSpLocks/>
+          </p:cNvCxnSpPr>
+          <p:nvPr userDrawn="1"/>
+        </p:nvCxnSpPr>
+        <p:spPr>
+          <a:xfrm>
+            <a:off x="2527301" y="3822700"/>
+            <a:ext cx="0" cy="2799556"/>
+          </a:xfrm>
+          <a:prstGeom prst="line">
+            <a:avLst/>
+          </a:prstGeom>
+          <a:ln w="44450">
+            <a:solidFill>
+              <a:schemeClr val="tx2"/>
+            </a:solidFill>
+          </a:ln>
+        </p:spPr>
+        <p:style>
+          <a:lnRef idx="1">
+            <a:schemeClr val="accent1"/>
+          </a:lnRef>
+          <a:fillRef idx="0">
+            <a:schemeClr val="accent1"/>
+          </a:fillRef>
+          <a:effectRef idx="0">
+            <a:schemeClr val="accent1"/>
+          </a:effectRef>
+          <a:fontRef idx="minor">
+            <a:schemeClr val="tx1"/>
+          </a:fontRef>
+        </p:style>
+      </p:cxnSp>
+      <p:sp>
+        <p:nvSpPr>
+          <p:cNvPr id="4" name="媒体占位符 3">
+            <a:extLst>
+              <a:ext uri="{FF2B5EF4-FFF2-40B4-BE49-F238E27FC236}">
+                <a16:creationId xmlns:a16="http://schemas.microsoft.com/office/drawing/2014/main" id="{F05CAE1B-DEF9-4C38-A50B-CDFE05ABCE3B}"/>
+              </a:ext>
+            </a:extLst>
+          </p:cNvPr>
+          <p:cNvSpPr>
+            <a:spLocks noGrp="1"/>
+          </p:cNvSpPr>
+          <p:nvPr>
+            <p:ph type="media" sz="quarter" idx="15"/>
+          </p:nvPr>
+        </p:nvSpPr>
+        <p:spPr>
+          <a:xfrm>
+            <a:off x="3489960" y="892174"/>
+            <a:ext cx="7482839" cy="5073650"/>
+          </a:xfrm>
+        </p:spPr>
+        <p:txBody>
+          <a:bodyPr/>
+          <a:lstStyle/>
+          <a:p>
+            <a:endParaRPr lang="zh-CN" altLang="en-US"/>
+          </a:p>
+        </p:txBody>
+      </p:sp>
+    </p:spTree>
+    <p:extLst>
+      <p:ext uri="{BB962C8B-B14F-4D97-AF65-F5344CB8AC3E}">
+        <p14:creationId xmlns:p14="http://schemas.microsoft.com/office/powerpoint/2010/main" val="1036363016"/>
       </p:ext>
     </p:extLst>
   </p:cSld>
@@ -8935,7 +8935,7 @@
 
 <file path=ppt/slideLayouts/slideLayout8.xml><?xml version="1.0" encoding="utf-8"?>
 <p:sldLayout xmlns:a="http://schemas.openxmlformats.org/drawingml/2006/main" xmlns:r="http://schemas.openxmlformats.org/officeDocument/2006/relationships" xmlns:p="http://schemas.openxmlformats.org/presentationml/2006/main" preserve="1" userDrawn="1">
-  <p:cSld name="Title Content and Chart">
+  <p:cSld name="Title Content and Media">
     <p:bg>
       <p:bgPr>
         <a:solidFill>
@@ -9347,10 +9347,10 @@
       </p:sp>
       <p:sp>
         <p:nvSpPr>
-          <p:cNvPr id="3" name="图表占位符 2">
-            <a:extLst>
-              <a:ext uri="{FF2B5EF4-FFF2-40B4-BE49-F238E27FC236}">
-                <a16:creationId xmlns:a16="http://schemas.microsoft.com/office/drawing/2014/main" id="{9EDC2E16-2FC6-47C1-9060-76684E8F65CA}"/>
+          <p:cNvPr id="5" name="媒体占位符 4">
+            <a:extLst>
+              <a:ext uri="{FF2B5EF4-FFF2-40B4-BE49-F238E27FC236}">
+                <a16:creationId xmlns:a16="http://schemas.microsoft.com/office/drawing/2014/main" id="{DD761FED-39EF-4ABA-979E-8B19B83483A1}"/>
               </a:ext>
             </a:extLst>
           </p:cNvPr>
@@ -9358,12 +9358,12 @@
             <a:spLocks noGrp="1"/>
           </p:cNvSpPr>
           <p:nvPr>
-            <p:ph type="chart" sz="quarter" idx="14"/>
+            <p:ph type="media" sz="quarter" idx="15"/>
           </p:nvPr>
         </p:nvSpPr>
         <p:spPr>
           <a:xfrm>
-            <a:off x="4851400" y="2495074"/>
+            <a:off x="4851399" y="2495072"/>
             <a:ext cx="6643944" cy="3776186"/>
           </a:xfrm>
         </p:spPr>
@@ -9371,14 +9371,14 @@
           <a:bodyPr/>
           <a:lstStyle/>
           <a:p>
-            <a:endParaRPr lang="zh-CN" altLang="en-US" dirty="0"/>
+            <a:endParaRPr lang="zh-CN" altLang="en-US"/>
           </a:p>
         </p:txBody>
       </p:sp>
     </p:spTree>
     <p:extLst>
       <p:ext uri="{BB962C8B-B14F-4D97-AF65-F5344CB8AC3E}">
-        <p14:creationId xmlns:p14="http://schemas.microsoft.com/office/powerpoint/2010/main" val="3877406510"/>
+        <p14:creationId xmlns:p14="http://schemas.microsoft.com/office/powerpoint/2010/main" val="1165427188"/>
       </p:ext>
     </p:extLst>
   </p:cSld>
@@ -10130,11 +10130,11 @@
     <p:sldLayoutId id="2147483738" r:id="rId1"/>
     <p:sldLayoutId id="2147483749" r:id="rId2"/>
     <p:sldLayoutId id="2147483750" r:id="rId3"/>
-    <p:sldLayoutId id="2147483753" r:id="rId4"/>
-    <p:sldLayoutId id="2147483751" r:id="rId5"/>
-    <p:sldLayoutId id="2147483754" r:id="rId6"/>
-    <p:sldLayoutId id="2147483745" r:id="rId7"/>
-    <p:sldLayoutId id="2147483752" r:id="rId8"/>
+    <p:sldLayoutId id="2147483751" r:id="rId4"/>
+    <p:sldLayoutId id="2147483745" r:id="rId5"/>
+    <p:sldLayoutId id="2147483752" r:id="rId6"/>
+    <p:sldLayoutId id="2147483753" r:id="rId7"/>
+    <p:sldLayoutId id="2147483754" r:id="rId8"/>
     <p:sldLayoutId id="2147483730" r:id="rId9"/>
     <p:sldLayoutId id="2147483747" r:id="rId10"/>
     <p:sldLayoutId id="2147483748" r:id="rId11"/>
@@ -11343,23 +11343,12 @@
 </file>
 
 <file path=customXml/item1.xml><?xml version="1.0" encoding="utf-8"?>
-<p:properties xmlns:p="http://schemas.microsoft.com/office/2006/metadata/properties" xmlns:xsi="http://www.w3.org/2001/XMLSchema-instance" xmlns:pc="http://schemas.microsoft.com/office/infopath/2007/PartnerControls">
-  <documentManagement>
-    <_ip_UnifiedCompliancePolicyUIAction xmlns="http://schemas.microsoft.com/sharepoint/v3" xsi:nil="true"/>
-    <Image xmlns="71af3243-3dd4-4a8d-8c0d-dd76da1f02a5">
-      <Url xsi:nil="true"/>
-      <Description xsi:nil="true"/>
-    </Image>
-    <Status xmlns="71af3243-3dd4-4a8d-8c0d-dd76da1f02a5">Not started</Status>
-    <Background xmlns="71af3243-3dd4-4a8d-8c0d-dd76da1f02a5">false</Background>
-    <_ip_UnifiedCompliancePolicyProperties xmlns="http://schemas.microsoft.com/sharepoint/v3" xsi:nil="true"/>
-    <ImageTagsTaxHTField xmlns="71af3243-3dd4-4a8d-8c0d-dd76da1f02a5">
-      <Terms xmlns="http://schemas.microsoft.com/office/infopath/2007/PartnerControls"/>
-    </ImageTagsTaxHTField>
-    <TaxCatchAll xmlns="230e9df3-be65-4c73-a93b-d1236ebd677e" xsi:nil="true"/>
-    <MediaServiceKeyPoints xmlns="71af3243-3dd4-4a8d-8c0d-dd76da1f02a5" xsi:nil="true"/>
-  </documentManagement>
-</p:properties>
+<?mso-contentType ?>
+<FormTemplates xmlns="http://schemas.microsoft.com/sharepoint/v3/contenttype/forms">
+  <Display>DocumentLibraryForm</Display>
+  <Edit>DocumentLibraryForm</Edit>
+  <New>DocumentLibraryForm</New>
+</FormTemplates>
 </file>
 
 <file path=customXml/item2.xml><?xml version="1.0" encoding="utf-8"?>
@@ -11675,22 +11664,29 @@
 </file>
 
 <file path=customXml/item3.xml><?xml version="1.0" encoding="utf-8"?>
-<?mso-contentType ?>
-<FormTemplates xmlns="http://schemas.microsoft.com/sharepoint/v3/contenttype/forms">
-  <Display>DocumentLibraryForm</Display>
-  <Edit>DocumentLibraryForm</Edit>
-  <New>DocumentLibraryForm</New>
-</FormTemplates>
+<p:properties xmlns:p="http://schemas.microsoft.com/office/2006/metadata/properties" xmlns:xsi="http://www.w3.org/2001/XMLSchema-instance" xmlns:pc="http://schemas.microsoft.com/office/infopath/2007/PartnerControls">
+  <documentManagement>
+    <_ip_UnifiedCompliancePolicyUIAction xmlns="http://schemas.microsoft.com/sharepoint/v3" xsi:nil="true"/>
+    <Image xmlns="71af3243-3dd4-4a8d-8c0d-dd76da1f02a5">
+      <Url xsi:nil="true"/>
+      <Description xsi:nil="true"/>
+    </Image>
+    <Status xmlns="71af3243-3dd4-4a8d-8c0d-dd76da1f02a5">Not started</Status>
+    <Background xmlns="71af3243-3dd4-4a8d-8c0d-dd76da1f02a5">false</Background>
+    <_ip_UnifiedCompliancePolicyProperties xmlns="http://schemas.microsoft.com/sharepoint/v3" xsi:nil="true"/>
+    <ImageTagsTaxHTField xmlns="71af3243-3dd4-4a8d-8c0d-dd76da1f02a5">
+      <Terms xmlns="http://schemas.microsoft.com/office/infopath/2007/PartnerControls"/>
+    </ImageTagsTaxHTField>
+    <TaxCatchAll xmlns="230e9df3-be65-4c73-a93b-d1236ebd677e" xsi:nil="true"/>
+    <MediaServiceKeyPoints xmlns="71af3243-3dd4-4a8d-8c0d-dd76da1f02a5" xsi:nil="true"/>
+  </documentManagement>
+</p:properties>
 </file>
 
 <file path=customXml/itemProps1.xml><?xml version="1.0" encoding="utf-8"?>
-<ds:datastoreItem xmlns:ds="http://schemas.openxmlformats.org/officeDocument/2006/customXml" ds:itemID="{89316C43-4A17-4971-BB8F-F0F6B8CDF2E0}">
+<ds:datastoreItem xmlns:ds="http://schemas.openxmlformats.org/officeDocument/2006/customXml" ds:itemID="{F5C14155-A57F-48FA-B253-A79CB6269DDC}">
   <ds:schemaRefs>
-    <ds:schemaRef ds:uri="http://schemas.microsoft.com/office/2006/metadata/properties"/>
-    <ds:schemaRef ds:uri="http://schemas.microsoft.com/office/infopath/2007/PartnerControls"/>
-    <ds:schemaRef ds:uri="http://schemas.microsoft.com/sharepoint/v3"/>
-    <ds:schemaRef ds:uri="71af3243-3dd4-4a8d-8c0d-dd76da1f02a5"/>
-    <ds:schemaRef ds:uri="230e9df3-be65-4c73-a93b-d1236ebd677e"/>
+    <ds:schemaRef ds:uri="http://schemas.microsoft.com/sharepoint/v3/contenttype/forms"/>
   </ds:schemaRefs>
 </ds:datastoreItem>
 </file>
@@ -11717,9 +11713,13 @@
 </file>
 
 <file path=customXml/itemProps3.xml><?xml version="1.0" encoding="utf-8"?>
-<ds:datastoreItem xmlns:ds="http://schemas.openxmlformats.org/officeDocument/2006/customXml" ds:itemID="{F5C14155-A57F-48FA-B253-A79CB6269DDC}">
+<ds:datastoreItem xmlns:ds="http://schemas.openxmlformats.org/officeDocument/2006/customXml" ds:itemID="{89316C43-4A17-4971-BB8F-F0F6B8CDF2E0}">
   <ds:schemaRefs>
-    <ds:schemaRef ds:uri="http://schemas.microsoft.com/sharepoint/v3/contenttype/forms"/>
+    <ds:schemaRef ds:uri="http://schemas.microsoft.com/office/2006/metadata/properties"/>
+    <ds:schemaRef ds:uri="http://schemas.microsoft.com/office/infopath/2007/PartnerControls"/>
+    <ds:schemaRef ds:uri="http://schemas.microsoft.com/sharepoint/v3"/>
+    <ds:schemaRef ds:uri="71af3243-3dd4-4a8d-8c0d-dd76da1f02a5"/>
+    <ds:schemaRef ds:uri="230e9df3-be65-4c73-a93b-d1236ebd677e"/>
   </ds:schemaRefs>
 </ds:datastoreItem>
 </file>

</xml_diff>